<commit_message>
pvc ppt and example
</commit_message>
<xml_diff>
--- a/day-4/Using Kubernetes Day 4.pptx
+++ b/day-4/Using Kubernetes Day 4.pptx
@@ -23,6 +23,7 @@
     <p:sldId id="299" r:id="rId17"/>
     <p:sldId id="300" r:id="rId18"/>
     <p:sldId id="301" r:id="rId19"/>
+    <p:sldId id="302" r:id="rId20"/>
   </p:sldIdLst>
   <p:sldSz cx="12192000" cy="6858000"/>
   <p:notesSz cx="6858000" cy="9144000"/>
@@ -278,7 +279,7 @@
           <a:p>
             <a:fld id="{42C2343A-BF2E-4E4B-99FA-FDD616CF880E}" type="datetimeFigureOut">
               <a:rPr lang="en-IL" smtClean="0"/>
-              <a:t>28/02/2022</a:t>
+              <a:t>08/03/2022</a:t>
             </a:fld>
             <a:endParaRPr lang="en-IL"/>
           </a:p>
@@ -478,7 +479,7 @@
           <a:p>
             <a:fld id="{42C2343A-BF2E-4E4B-99FA-FDD616CF880E}" type="datetimeFigureOut">
               <a:rPr lang="en-IL" smtClean="0"/>
-              <a:t>28/02/2022</a:t>
+              <a:t>08/03/2022</a:t>
             </a:fld>
             <a:endParaRPr lang="en-IL"/>
           </a:p>
@@ -688,7 +689,7 @@
           <a:p>
             <a:fld id="{42C2343A-BF2E-4E4B-99FA-FDD616CF880E}" type="datetimeFigureOut">
               <a:rPr lang="en-IL" smtClean="0"/>
-              <a:t>28/02/2022</a:t>
+              <a:t>08/03/2022</a:t>
             </a:fld>
             <a:endParaRPr lang="en-IL"/>
           </a:p>
@@ -993,7 +994,7 @@
           <a:p>
             <a:fld id="{42C2343A-BF2E-4E4B-99FA-FDD616CF880E}" type="datetimeFigureOut">
               <a:rPr lang="en-IL" smtClean="0"/>
-              <a:t>28/02/2022</a:t>
+              <a:t>08/03/2022</a:t>
             </a:fld>
             <a:endParaRPr lang="en-IL"/>
           </a:p>
@@ -1269,7 +1270,7 @@
           <a:p>
             <a:fld id="{42C2343A-BF2E-4E4B-99FA-FDD616CF880E}" type="datetimeFigureOut">
               <a:rPr lang="en-IL" smtClean="0"/>
-              <a:t>28/02/2022</a:t>
+              <a:t>08/03/2022</a:t>
             </a:fld>
             <a:endParaRPr lang="en-IL"/>
           </a:p>
@@ -1537,7 +1538,7 @@
           <a:p>
             <a:fld id="{42C2343A-BF2E-4E4B-99FA-FDD616CF880E}" type="datetimeFigureOut">
               <a:rPr lang="en-IL" smtClean="0"/>
-              <a:t>28/02/2022</a:t>
+              <a:t>08/03/2022</a:t>
             </a:fld>
             <a:endParaRPr lang="en-IL"/>
           </a:p>
@@ -1952,7 +1953,7 @@
           <a:p>
             <a:fld id="{42C2343A-BF2E-4E4B-99FA-FDD616CF880E}" type="datetimeFigureOut">
               <a:rPr lang="en-IL" smtClean="0"/>
-              <a:t>28/02/2022</a:t>
+              <a:t>08/03/2022</a:t>
             </a:fld>
             <a:endParaRPr lang="en-IL"/>
           </a:p>
@@ -2094,7 +2095,7 @@
           <a:p>
             <a:fld id="{42C2343A-BF2E-4E4B-99FA-FDD616CF880E}" type="datetimeFigureOut">
               <a:rPr lang="en-IL" smtClean="0"/>
-              <a:t>28/02/2022</a:t>
+              <a:t>08/03/2022</a:t>
             </a:fld>
             <a:endParaRPr lang="en-IL"/>
           </a:p>
@@ -2207,7 +2208,7 @@
           <a:p>
             <a:fld id="{42C2343A-BF2E-4E4B-99FA-FDD616CF880E}" type="datetimeFigureOut">
               <a:rPr lang="en-IL" smtClean="0"/>
-              <a:t>28/02/2022</a:t>
+              <a:t>08/03/2022</a:t>
             </a:fld>
             <a:endParaRPr lang="en-IL"/>
           </a:p>
@@ -2520,7 +2521,7 @@
           <a:p>
             <a:fld id="{42C2343A-BF2E-4E4B-99FA-FDD616CF880E}" type="datetimeFigureOut">
               <a:rPr lang="en-IL" smtClean="0"/>
-              <a:t>28/02/2022</a:t>
+              <a:t>08/03/2022</a:t>
             </a:fld>
             <a:endParaRPr lang="en-IL"/>
           </a:p>
@@ -2809,7 +2810,7 @@
           <a:p>
             <a:fld id="{42C2343A-BF2E-4E4B-99FA-FDD616CF880E}" type="datetimeFigureOut">
               <a:rPr lang="en-IL" smtClean="0"/>
-              <a:t>28/02/2022</a:t>
+              <a:t>08/03/2022</a:t>
             </a:fld>
             <a:endParaRPr lang="en-IL"/>
           </a:p>
@@ -3052,7 +3053,7 @@
           <a:p>
             <a:fld id="{42C2343A-BF2E-4E4B-99FA-FDD616CF880E}" type="datetimeFigureOut">
               <a:rPr lang="en-IL" smtClean="0"/>
-              <a:t>28/02/2022</a:t>
+              <a:t>08/03/2022</a:t>
             </a:fld>
             <a:endParaRPr lang="en-IL"/>
           </a:p>
@@ -9632,6 +9633,206 @@
     <p:extLst>
       <p:ext uri="{BB962C8B-B14F-4D97-AF65-F5344CB8AC3E}">
         <p14:creationId xmlns:p14="http://schemas.microsoft.com/office/powerpoint/2010/main" val="3498726630"/>
+      </p:ext>
+    </p:extLst>
+  </p:cSld>
+  <p:clrMapOvr>
+    <a:masterClrMapping/>
+  </p:clrMapOvr>
+  <p:timing>
+    <p:tnLst>
+      <p:par>
+        <p:cTn id="1" dur="indefinite" restart="never" nodeType="tmRoot">
+          <p:childTnLst>
+            <p:seq>
+              <p:cTn id="2" nodeType="mainSeq"/>
+              <p:prevCondLst>
+                <p:cond evt="onPrev" delay="0">
+                  <p:tgtEl>
+                    <p:sldTgt/>
+                  </p:tgtEl>
+                </p:cond>
+              </p:prevCondLst>
+              <p:nextCondLst>
+                <p:cond evt="onNext" delay="0">
+                  <p:tgtEl>
+                    <p:sldTgt/>
+                  </p:tgtEl>
+                </p:cond>
+              </p:nextCondLst>
+            </p:seq>
+          </p:childTnLst>
+        </p:cTn>
+      </p:par>
+    </p:tnLst>
+  </p:timing>
+</p:sld>
+</file>
+
+<file path=ppt/slides/slide19.xml><?xml version="1.0" encoding="utf-8"?>
+<p:sld xmlns:a="http://schemas.openxmlformats.org/drawingml/2006/main" xmlns:r="http://schemas.openxmlformats.org/officeDocument/2006/relationships" xmlns:p="http://schemas.openxmlformats.org/presentationml/2006/main">
+  <p:cSld>
+    <p:spTree>
+      <p:nvGrpSpPr>
+        <p:cNvPr id="1" name=""/>
+        <p:cNvGrpSpPr/>
+        <p:nvPr/>
+      </p:nvGrpSpPr>
+      <p:grpSpPr>
+        <a:xfrm>
+          <a:off x="0" y="0"/>
+          <a:ext cx="0" cy="0"/>
+          <a:chOff x="0" y="0"/>
+          <a:chExt cx="0" cy="0"/>
+        </a:xfrm>
+      </p:grpSpPr>
+      <p:sp>
+        <p:nvSpPr>
+          <p:cNvPr id="455" name="CustomShape 1"/>
+          <p:cNvSpPr/>
+          <p:nvPr/>
+        </p:nvSpPr>
+        <p:spPr>
+          <a:xfrm>
+            <a:off x="838080" y="365040"/>
+            <a:ext cx="10514880" cy="1324800"/>
+          </a:xfrm>
+          <a:prstGeom prst="rect">
+            <a:avLst/>
+          </a:prstGeom>
+          <a:noFill/>
+          <a:ln>
+            <a:noFill/>
+          </a:ln>
+        </p:spPr>
+        <p:style>
+          <a:lnRef idx="0">
+            <a:scrgbClr r="0" g="0" b="0"/>
+          </a:lnRef>
+          <a:fillRef idx="0">
+            <a:scrgbClr r="0" g="0" b="0"/>
+          </a:fillRef>
+          <a:effectRef idx="0">
+            <a:scrgbClr r="0" g="0" b="0"/>
+          </a:effectRef>
+          <a:fontRef idx="minor"/>
+        </p:style>
+        <p:txBody>
+          <a:bodyPr lIns="90000" tIns="45000" rIns="90000" bIns="45000" anchor="ctr"/>
+          <a:lstStyle/>
+          <a:p>
+            <a:pPr>
+              <a:lnSpc>
+                <a:spcPct val="90000"/>
+              </a:lnSpc>
+            </a:pPr>
+            <a:r>
+              <a:rPr lang="en-US" sz="4000" b="0" strike="noStrike" spc="-1">
+                <a:solidFill>
+                  <a:srgbClr val="000000"/>
+                </a:solidFill>
+                <a:uFill>
+                  <a:solidFill>
+                    <a:srgbClr val="FFFFFF"/>
+                  </a:solidFill>
+                </a:uFill>
+                <a:latin typeface="Calibri Light"/>
+              </a:rPr>
+              <a:t>Volume – Persistent Volume Claim (PVC)</a:t>
+            </a:r>
+            <a:endParaRPr lang="en-US" sz="4000" b="0" strike="noStrike" spc="-1" dirty="0">
+              <a:solidFill>
+                <a:srgbClr val="000000"/>
+              </a:solidFill>
+              <a:uFill>
+                <a:solidFill>
+                  <a:srgbClr val="FFFFFF"/>
+                </a:solidFill>
+              </a:uFill>
+              <a:latin typeface="Arial"/>
+            </a:endParaRPr>
+          </a:p>
+        </p:txBody>
+      </p:sp>
+      <p:pic>
+        <p:nvPicPr>
+          <p:cNvPr id="5" name="Picture 4">
+            <a:extLst>
+              <a:ext uri="{FF2B5EF4-FFF2-40B4-BE49-F238E27FC236}">
+                <a16:creationId xmlns:a16="http://schemas.microsoft.com/office/drawing/2014/main" id="{57D5AB8A-25B7-CD4D-A3E3-25A1AA91105E}"/>
+              </a:ext>
+            </a:extLst>
+          </p:cNvPr>
+          <p:cNvPicPr>
+            <a:picLocks noChangeAspect="1"/>
+          </p:cNvPicPr>
+          <p:nvPr/>
+        </p:nvPicPr>
+        <p:blipFill>
+          <a:blip r:embed="rId2"/>
+          <a:stretch>
+            <a:fillRect/>
+          </a:stretch>
+        </p:blipFill>
+        <p:spPr>
+          <a:xfrm>
+            <a:off x="5947069" y="1689840"/>
+            <a:ext cx="4322001" cy="4909458"/>
+          </a:xfrm>
+          <a:prstGeom prst="rect">
+            <a:avLst/>
+          </a:prstGeom>
+          <a:solidFill>
+            <a:schemeClr val="bg2">
+              <a:lumMod val="90000"/>
+            </a:schemeClr>
+          </a:solidFill>
+          <a:ln w="22225">
+            <a:solidFill>
+              <a:schemeClr val="accent1"/>
+            </a:solidFill>
+          </a:ln>
+        </p:spPr>
+      </p:pic>
+      <p:pic>
+        <p:nvPicPr>
+          <p:cNvPr id="6" name="Picture 5">
+            <a:extLst>
+              <a:ext uri="{FF2B5EF4-FFF2-40B4-BE49-F238E27FC236}">
+                <a16:creationId xmlns:a16="http://schemas.microsoft.com/office/drawing/2014/main" id="{88361D17-4AA5-5249-A185-6B922E1222E6}"/>
+              </a:ext>
+            </a:extLst>
+          </p:cNvPr>
+          <p:cNvPicPr>
+            <a:picLocks noChangeAspect="1"/>
+          </p:cNvPicPr>
+          <p:nvPr/>
+        </p:nvPicPr>
+        <p:blipFill>
+          <a:blip r:embed="rId3"/>
+          <a:stretch>
+            <a:fillRect/>
+          </a:stretch>
+        </p:blipFill>
+        <p:spPr>
+          <a:xfrm>
+            <a:off x="838080" y="1700726"/>
+            <a:ext cx="4356100" cy="3949700"/>
+          </a:xfrm>
+          <a:prstGeom prst="rect">
+            <a:avLst/>
+          </a:prstGeom>
+          <a:ln w="25400">
+            <a:solidFill>
+              <a:schemeClr val="accent1"/>
+            </a:solidFill>
+          </a:ln>
+        </p:spPr>
+      </p:pic>
+    </p:spTree>
+    <p:extLst>
+      <p:ext uri="{BB962C8B-B14F-4D97-AF65-F5344CB8AC3E}">
+        <p14:creationId xmlns:p14="http://schemas.microsoft.com/office/powerpoint/2010/main" val="9040121"/>
       </p:ext>
     </p:extLst>
   </p:cSld>

</xml_diff>

<commit_message>
pvc fix azure file example
</commit_message>
<xml_diff>
--- a/day-4/Using Kubernetes Day 4.pptx
+++ b/day-4/Using Kubernetes Day 4.pptx
@@ -279,7 +279,7 @@
           <a:p>
             <a:fld id="{42C2343A-BF2E-4E4B-99FA-FDD616CF880E}" type="datetimeFigureOut">
               <a:rPr lang="en-IL" smtClean="0"/>
-              <a:t>08/03/2022</a:t>
+              <a:t>09/03/2022</a:t>
             </a:fld>
             <a:endParaRPr lang="en-IL"/>
           </a:p>
@@ -479,7 +479,7 @@
           <a:p>
             <a:fld id="{42C2343A-BF2E-4E4B-99FA-FDD616CF880E}" type="datetimeFigureOut">
               <a:rPr lang="en-IL" smtClean="0"/>
-              <a:t>08/03/2022</a:t>
+              <a:t>09/03/2022</a:t>
             </a:fld>
             <a:endParaRPr lang="en-IL"/>
           </a:p>
@@ -689,7 +689,7 @@
           <a:p>
             <a:fld id="{42C2343A-BF2E-4E4B-99FA-FDD616CF880E}" type="datetimeFigureOut">
               <a:rPr lang="en-IL" smtClean="0"/>
-              <a:t>08/03/2022</a:t>
+              <a:t>09/03/2022</a:t>
             </a:fld>
             <a:endParaRPr lang="en-IL"/>
           </a:p>
@@ -994,7 +994,7 @@
           <a:p>
             <a:fld id="{42C2343A-BF2E-4E4B-99FA-FDD616CF880E}" type="datetimeFigureOut">
               <a:rPr lang="en-IL" smtClean="0"/>
-              <a:t>08/03/2022</a:t>
+              <a:t>09/03/2022</a:t>
             </a:fld>
             <a:endParaRPr lang="en-IL"/>
           </a:p>
@@ -1270,7 +1270,7 @@
           <a:p>
             <a:fld id="{42C2343A-BF2E-4E4B-99FA-FDD616CF880E}" type="datetimeFigureOut">
               <a:rPr lang="en-IL" smtClean="0"/>
-              <a:t>08/03/2022</a:t>
+              <a:t>09/03/2022</a:t>
             </a:fld>
             <a:endParaRPr lang="en-IL"/>
           </a:p>
@@ -1538,7 +1538,7 @@
           <a:p>
             <a:fld id="{42C2343A-BF2E-4E4B-99FA-FDD616CF880E}" type="datetimeFigureOut">
               <a:rPr lang="en-IL" smtClean="0"/>
-              <a:t>08/03/2022</a:t>
+              <a:t>09/03/2022</a:t>
             </a:fld>
             <a:endParaRPr lang="en-IL"/>
           </a:p>
@@ -1953,7 +1953,7 @@
           <a:p>
             <a:fld id="{42C2343A-BF2E-4E4B-99FA-FDD616CF880E}" type="datetimeFigureOut">
               <a:rPr lang="en-IL" smtClean="0"/>
-              <a:t>08/03/2022</a:t>
+              <a:t>09/03/2022</a:t>
             </a:fld>
             <a:endParaRPr lang="en-IL"/>
           </a:p>
@@ -2095,7 +2095,7 @@
           <a:p>
             <a:fld id="{42C2343A-BF2E-4E4B-99FA-FDD616CF880E}" type="datetimeFigureOut">
               <a:rPr lang="en-IL" smtClean="0"/>
-              <a:t>08/03/2022</a:t>
+              <a:t>09/03/2022</a:t>
             </a:fld>
             <a:endParaRPr lang="en-IL"/>
           </a:p>
@@ -2208,7 +2208,7 @@
           <a:p>
             <a:fld id="{42C2343A-BF2E-4E4B-99FA-FDD616CF880E}" type="datetimeFigureOut">
               <a:rPr lang="en-IL" smtClean="0"/>
-              <a:t>08/03/2022</a:t>
+              <a:t>09/03/2022</a:t>
             </a:fld>
             <a:endParaRPr lang="en-IL"/>
           </a:p>
@@ -2521,7 +2521,7 @@
           <a:p>
             <a:fld id="{42C2343A-BF2E-4E4B-99FA-FDD616CF880E}" type="datetimeFigureOut">
               <a:rPr lang="en-IL" smtClean="0"/>
-              <a:t>08/03/2022</a:t>
+              <a:t>09/03/2022</a:t>
             </a:fld>
             <a:endParaRPr lang="en-IL"/>
           </a:p>
@@ -2810,7 +2810,7 @@
           <a:p>
             <a:fld id="{42C2343A-BF2E-4E4B-99FA-FDD616CF880E}" type="datetimeFigureOut">
               <a:rPr lang="en-IL" smtClean="0"/>
-              <a:t>08/03/2022</a:t>
+              <a:t>09/03/2022</a:t>
             </a:fld>
             <a:endParaRPr lang="en-IL"/>
           </a:p>
@@ -3053,7 +3053,7 @@
           <a:p>
             <a:fld id="{42C2343A-BF2E-4E4B-99FA-FDD616CF880E}" type="datetimeFigureOut">
               <a:rPr lang="en-IL" smtClean="0"/>
-              <a:t>08/03/2022</a:t>
+              <a:t>09/03/2022</a:t>
             </a:fld>
             <a:endParaRPr lang="en-IL"/>
           </a:p>
@@ -9796,10 +9796,10 @@
       </p:pic>
       <p:pic>
         <p:nvPicPr>
-          <p:cNvPr id="6" name="Picture 5">
+          <p:cNvPr id="3" name="Picture 2">
             <a:extLst>
               <a:ext uri="{FF2B5EF4-FFF2-40B4-BE49-F238E27FC236}">
-                <a16:creationId xmlns:a16="http://schemas.microsoft.com/office/drawing/2014/main" id="{88361D17-4AA5-5249-A185-6B922E1222E6}"/>
+                <a16:creationId xmlns:a16="http://schemas.microsoft.com/office/drawing/2014/main" id="{AC071C01-7DCB-914D-A72A-CDFAFD180E02}"/>
               </a:ext>
             </a:extLst>
           </p:cNvPr>
@@ -9816,8 +9816,8 @@
         </p:blipFill>
         <p:spPr>
           <a:xfrm>
-            <a:off x="838080" y="1700726"/>
-            <a:ext cx="4356100" cy="3949700"/>
+            <a:off x="838080" y="1689840"/>
+            <a:ext cx="4553490" cy="3807193"/>
           </a:xfrm>
           <a:prstGeom prst="rect">
             <a:avLst/>

</xml_diff>